<commit_message>
Almost finish without RWD
</commit_message>
<xml_diff>
--- a/img/portfolio/image-maker.pptx
+++ b/img/portfolio/image-maker.pptx
@@ -108,6 +108,11 @@
       </a:defRPr>
     </a:lvl9pPr>
   </p:defaultTextStyle>
+  <p:extLst>
+    <p:ext uri="{EFAFB233-063F-42B5-8137-9DF3F51BA10A}">
+      <p15:sldGuideLst xmlns:p15="http://schemas.microsoft.com/office/powerpoint/2012/main"/>
+    </p:ext>
+  </p:extLst>
 </p:presentation>
 </file>
 
@@ -258,7 +263,7 @@
           <a:p>
             <a:fld id="{F721C794-EA5C-7F40-97D9-858222FA7BF2}" type="datetimeFigureOut">
               <a:rPr kumimoji="1" lang="zh-TW" altLang="en-US" smtClean="0"/>
-              <a:t>2022/3/23</a:t>
+              <a:t>2022/3/27</a:t>
             </a:fld>
             <a:endParaRPr kumimoji="1" lang="zh-TW" altLang="en-US"/>
           </a:p>
@@ -456,7 +461,7 @@
           <a:p>
             <a:fld id="{F721C794-EA5C-7F40-97D9-858222FA7BF2}" type="datetimeFigureOut">
               <a:rPr kumimoji="1" lang="zh-TW" altLang="en-US" smtClean="0"/>
-              <a:t>2022/3/23</a:t>
+              <a:t>2022/3/27</a:t>
             </a:fld>
             <a:endParaRPr kumimoji="1" lang="zh-TW" altLang="en-US"/>
           </a:p>
@@ -664,7 +669,7 @@
           <a:p>
             <a:fld id="{F721C794-EA5C-7F40-97D9-858222FA7BF2}" type="datetimeFigureOut">
               <a:rPr kumimoji="1" lang="zh-TW" altLang="en-US" smtClean="0"/>
-              <a:t>2022/3/23</a:t>
+              <a:t>2022/3/27</a:t>
             </a:fld>
             <a:endParaRPr kumimoji="1" lang="zh-TW" altLang="en-US"/>
           </a:p>
@@ -862,7 +867,7 @@
           <a:p>
             <a:fld id="{F721C794-EA5C-7F40-97D9-858222FA7BF2}" type="datetimeFigureOut">
               <a:rPr kumimoji="1" lang="zh-TW" altLang="en-US" smtClean="0"/>
-              <a:t>2022/3/23</a:t>
+              <a:t>2022/3/27</a:t>
             </a:fld>
             <a:endParaRPr kumimoji="1" lang="zh-TW" altLang="en-US"/>
           </a:p>
@@ -1137,7 +1142,7 @@
           <a:p>
             <a:fld id="{F721C794-EA5C-7F40-97D9-858222FA7BF2}" type="datetimeFigureOut">
               <a:rPr kumimoji="1" lang="zh-TW" altLang="en-US" smtClean="0"/>
-              <a:t>2022/3/23</a:t>
+              <a:t>2022/3/27</a:t>
             </a:fld>
             <a:endParaRPr kumimoji="1" lang="zh-TW" altLang="en-US"/>
           </a:p>
@@ -1402,7 +1407,7 @@
           <a:p>
             <a:fld id="{F721C794-EA5C-7F40-97D9-858222FA7BF2}" type="datetimeFigureOut">
               <a:rPr kumimoji="1" lang="zh-TW" altLang="en-US" smtClean="0"/>
-              <a:t>2022/3/23</a:t>
+              <a:t>2022/3/27</a:t>
             </a:fld>
             <a:endParaRPr kumimoji="1" lang="zh-TW" altLang="en-US"/>
           </a:p>
@@ -1814,7 +1819,7 @@
           <a:p>
             <a:fld id="{F721C794-EA5C-7F40-97D9-858222FA7BF2}" type="datetimeFigureOut">
               <a:rPr kumimoji="1" lang="zh-TW" altLang="en-US" smtClean="0"/>
-              <a:t>2022/3/23</a:t>
+              <a:t>2022/3/27</a:t>
             </a:fld>
             <a:endParaRPr kumimoji="1" lang="zh-TW" altLang="en-US"/>
           </a:p>
@@ -1955,7 +1960,7 @@
           <a:p>
             <a:fld id="{F721C794-EA5C-7F40-97D9-858222FA7BF2}" type="datetimeFigureOut">
               <a:rPr kumimoji="1" lang="zh-TW" altLang="en-US" smtClean="0"/>
-              <a:t>2022/3/23</a:t>
+              <a:t>2022/3/27</a:t>
             </a:fld>
             <a:endParaRPr kumimoji="1" lang="zh-TW" altLang="en-US"/>
           </a:p>
@@ -2068,7 +2073,7 @@
           <a:p>
             <a:fld id="{F721C794-EA5C-7F40-97D9-858222FA7BF2}" type="datetimeFigureOut">
               <a:rPr kumimoji="1" lang="zh-TW" altLang="en-US" smtClean="0"/>
-              <a:t>2022/3/23</a:t>
+              <a:t>2022/3/27</a:t>
             </a:fld>
             <a:endParaRPr kumimoji="1" lang="zh-TW" altLang="en-US"/>
           </a:p>
@@ -2379,7 +2384,7 @@
           <a:p>
             <a:fld id="{F721C794-EA5C-7F40-97D9-858222FA7BF2}" type="datetimeFigureOut">
               <a:rPr kumimoji="1" lang="zh-TW" altLang="en-US" smtClean="0"/>
-              <a:t>2022/3/23</a:t>
+              <a:t>2022/3/27</a:t>
             </a:fld>
             <a:endParaRPr kumimoji="1" lang="zh-TW" altLang="en-US"/>
           </a:p>
@@ -2667,7 +2672,7 @@
           <a:p>
             <a:fld id="{F721C794-EA5C-7F40-97D9-858222FA7BF2}" type="datetimeFigureOut">
               <a:rPr kumimoji="1" lang="zh-TW" altLang="en-US" smtClean="0"/>
-              <a:t>2022/3/23</a:t>
+              <a:t>2022/3/27</a:t>
             </a:fld>
             <a:endParaRPr kumimoji="1" lang="zh-TW" altLang="en-US"/>
           </a:p>
@@ -2908,7 +2913,7 @@
           <a:p>
             <a:fld id="{F721C794-EA5C-7F40-97D9-858222FA7BF2}" type="datetimeFigureOut">
               <a:rPr kumimoji="1" lang="zh-TW" altLang="en-US" smtClean="0"/>
-              <a:t>2022/3/23</a:t>
+              <a:t>2022/3/27</a:t>
             </a:fld>
             <a:endParaRPr kumimoji="1" lang="zh-TW" altLang="en-US"/>
           </a:p>
@@ -4099,301 +4104,36 @@
           <a:chExt cx="0" cy="0"/>
         </a:xfrm>
       </p:grpSpPr>
-      <p:cxnSp>
-        <p:nvCxnSpPr>
-          <p:cNvPr id="5" name="直線接點 4">
-            <a:extLst>
-              <a:ext uri="{FF2B5EF4-FFF2-40B4-BE49-F238E27FC236}">
-                <a16:creationId xmlns:a16="http://schemas.microsoft.com/office/drawing/2014/main" id="{9D1E3C31-7B75-6F48-9054-F19CC17BF6A6}"/>
-              </a:ext>
-            </a:extLst>
-          </p:cNvPr>
-          <p:cNvCxnSpPr>
-            <a:cxnSpLocks/>
-          </p:cNvCxnSpPr>
+      <p:pic>
+        <p:nvPicPr>
+          <p:cNvPr id="8" name="圖片 7">
+            <a:extLst>
+              <a:ext uri="{FF2B5EF4-FFF2-40B4-BE49-F238E27FC236}">
+                <a16:creationId xmlns:a16="http://schemas.microsoft.com/office/drawing/2014/main" id="{B6DD4E68-19E0-304C-86E5-855CDEC55046}"/>
+              </a:ext>
+            </a:extLst>
+          </p:cNvPr>
+          <p:cNvPicPr>
+            <a:picLocks noChangeAspect="1"/>
+          </p:cNvPicPr>
           <p:nvPr/>
-        </p:nvCxnSpPr>
+        </p:nvPicPr>
+        <p:blipFill>
+          <a:blip r:embed="rId2"/>
+          <a:stretch>
+            <a:fillRect/>
+          </a:stretch>
+        </p:blipFill>
         <p:spPr>
           <a:xfrm>
-            <a:off x="2512531" y="645478"/>
-            <a:ext cx="3144002" cy="0"/>
-          </a:xfrm>
-          <a:prstGeom prst="line">
-            <a:avLst/>
-          </a:prstGeom>
-        </p:spPr>
-        <p:style>
-          <a:lnRef idx="1">
-            <a:schemeClr val="dk1"/>
-          </a:lnRef>
-          <a:fillRef idx="0">
-            <a:schemeClr val="dk1"/>
-          </a:fillRef>
-          <a:effectRef idx="0">
-            <a:schemeClr val="dk1"/>
-          </a:effectRef>
-          <a:fontRef idx="minor">
-            <a:schemeClr val="tx1"/>
-          </a:fontRef>
-        </p:style>
-      </p:cxnSp>
-      <p:sp>
-        <p:nvSpPr>
-          <p:cNvPr id="6" name="文字方塊 5">
-            <a:extLst>
-              <a:ext uri="{FF2B5EF4-FFF2-40B4-BE49-F238E27FC236}">
-                <a16:creationId xmlns:a16="http://schemas.microsoft.com/office/drawing/2014/main" id="{5961E481-A95B-BF4A-99FF-1FD4F439966B}"/>
-              </a:ext>
-            </a:extLst>
-          </p:cNvPr>
-          <p:cNvSpPr txBox="1"/>
-          <p:nvPr/>
-        </p:nvSpPr>
-        <p:spPr>
-          <a:xfrm>
-            <a:off x="3434354" y="161851"/>
-            <a:ext cx="1300356" cy="369332"/>
+            <a:off x="249766" y="714049"/>
+            <a:ext cx="11692467" cy="5198474"/>
           </a:xfrm>
           <a:prstGeom prst="rect">
             <a:avLst/>
           </a:prstGeom>
-          <a:noFill/>
         </p:spPr>
-        <p:txBody>
-          <a:bodyPr wrap="none" rtlCol="0">
-            <a:spAutoFit/>
-          </a:bodyPr>
-          <a:lstStyle/>
-          <a:p>
-            <a:r>
-              <a:rPr kumimoji="1" lang="en-US" altLang="zh-TW" b="1" dirty="0">
-                <a:latin typeface="Arial" panose="020B0604020202020204" pitchFamily="34" charset="0"/>
-                <a:cs typeface="Arial" panose="020B0604020202020204" pitchFamily="34" charset="0"/>
-              </a:rPr>
-              <a:t>Education</a:t>
-            </a:r>
-            <a:endParaRPr kumimoji="1" lang="zh-TW" altLang="en-US" b="1" dirty="0">
-              <a:latin typeface="Arial" panose="020B0604020202020204" pitchFamily="34" charset="0"/>
-              <a:cs typeface="Arial" panose="020B0604020202020204" pitchFamily="34" charset="0"/>
-            </a:endParaRPr>
-          </a:p>
-        </p:txBody>
-      </p:sp>
-      <p:sp>
-        <p:nvSpPr>
-          <p:cNvPr id="9" name="文字方塊 8">
-            <a:extLst>
-              <a:ext uri="{FF2B5EF4-FFF2-40B4-BE49-F238E27FC236}">
-                <a16:creationId xmlns:a16="http://schemas.microsoft.com/office/drawing/2014/main" id="{FA479AD3-B50C-6748-A187-030CCA559A66}"/>
-              </a:ext>
-            </a:extLst>
-          </p:cNvPr>
-          <p:cNvSpPr txBox="1"/>
-          <p:nvPr/>
-        </p:nvSpPr>
-        <p:spPr>
-          <a:xfrm>
-            <a:off x="3682018" y="759775"/>
-            <a:ext cx="904415" cy="338554"/>
-          </a:xfrm>
-          <a:prstGeom prst="rect">
-            <a:avLst/>
-          </a:prstGeom>
-          <a:noFill/>
-        </p:spPr>
-        <p:txBody>
-          <a:bodyPr wrap="none" rtlCol="0">
-            <a:spAutoFit/>
-          </a:bodyPr>
-          <a:lstStyle/>
-          <a:p>
-            <a:r>
-              <a:rPr kumimoji="1" lang="en-US" altLang="zh-TW" sz="1600" b="1" dirty="0">
-                <a:latin typeface="Arial" panose="020B0604020202020204" pitchFamily="34" charset="0"/>
-                <a:cs typeface="Arial" panose="020B0604020202020204" pitchFamily="34" charset="0"/>
-              </a:rPr>
-              <a:t>Master </a:t>
-            </a:r>
-            <a:endParaRPr kumimoji="1" lang="zh-TW" altLang="en-US" b="1" dirty="0">
-              <a:latin typeface="Arial" panose="020B0604020202020204" pitchFamily="34" charset="0"/>
-              <a:cs typeface="Arial" panose="020B0604020202020204" pitchFamily="34" charset="0"/>
-            </a:endParaRPr>
-          </a:p>
-        </p:txBody>
-      </p:sp>
-      <p:sp>
-        <p:nvSpPr>
-          <p:cNvPr id="10" name="文字方塊 9">
-            <a:extLst>
-              <a:ext uri="{FF2B5EF4-FFF2-40B4-BE49-F238E27FC236}">
-                <a16:creationId xmlns:a16="http://schemas.microsoft.com/office/drawing/2014/main" id="{AF5F2565-2EF3-2048-B02D-A786EED9791A}"/>
-              </a:ext>
-            </a:extLst>
-          </p:cNvPr>
-          <p:cNvSpPr txBox="1"/>
-          <p:nvPr/>
-        </p:nvSpPr>
-        <p:spPr>
-          <a:xfrm>
-            <a:off x="2459728" y="1031585"/>
-            <a:ext cx="3249608" cy="738664"/>
-          </a:xfrm>
-          <a:prstGeom prst="rect">
-            <a:avLst/>
-          </a:prstGeom>
-          <a:noFill/>
-        </p:spPr>
-        <p:txBody>
-          <a:bodyPr wrap="none" rtlCol="0">
-            <a:spAutoFit/>
-          </a:bodyPr>
-          <a:lstStyle/>
-          <a:p>
-            <a:pPr algn="ctr"/>
-            <a:r>
-              <a:rPr kumimoji="1" lang="en-US" altLang="zh-TW" sz="1400" dirty="0">
-                <a:latin typeface="Arial" panose="020B0604020202020204" pitchFamily="34" charset="0"/>
-                <a:cs typeface="Arial" panose="020B0604020202020204" pitchFamily="34" charset="0"/>
-              </a:rPr>
-              <a:t>Taiwan Tech</a:t>
-            </a:r>
-          </a:p>
-          <a:p>
-            <a:r>
-              <a:rPr kumimoji="1" lang="en-US" altLang="zh-TW" sz="1400" dirty="0">
-                <a:latin typeface="Arial" panose="020B0604020202020204" pitchFamily="34" charset="0"/>
-                <a:cs typeface="Arial" panose="020B0604020202020204" pitchFamily="34" charset="0"/>
-              </a:rPr>
-              <a:t>Electronics and Computer Engineering</a:t>
-            </a:r>
-          </a:p>
-          <a:p>
-            <a:pPr algn="ctr"/>
-            <a:r>
-              <a:rPr kumimoji="1" lang="en-US" altLang="zh-TW" sz="1400" dirty="0">
-                <a:latin typeface="Arial" panose="020B0604020202020204" pitchFamily="34" charset="0"/>
-                <a:cs typeface="Arial" panose="020B0604020202020204" pitchFamily="34" charset="0"/>
-              </a:rPr>
-              <a:t>GPA: 3.83 / 4.3</a:t>
-            </a:r>
-            <a:endParaRPr kumimoji="1" lang="zh-TW" altLang="en-US" sz="1600" dirty="0">
-              <a:latin typeface="Arial" panose="020B0604020202020204" pitchFamily="34" charset="0"/>
-              <a:cs typeface="Arial" panose="020B0604020202020204" pitchFamily="34" charset="0"/>
-            </a:endParaRPr>
-          </a:p>
-        </p:txBody>
-      </p:sp>
-      <p:sp>
-        <p:nvSpPr>
-          <p:cNvPr id="11" name="文字方塊 10">
-            <a:extLst>
-              <a:ext uri="{FF2B5EF4-FFF2-40B4-BE49-F238E27FC236}">
-                <a16:creationId xmlns:a16="http://schemas.microsoft.com/office/drawing/2014/main" id="{ACE9100F-9151-7E49-9AEB-C617AFC9052D}"/>
-              </a:ext>
-            </a:extLst>
-          </p:cNvPr>
-          <p:cNvSpPr txBox="1"/>
-          <p:nvPr/>
-        </p:nvSpPr>
-        <p:spPr>
-          <a:xfrm>
-            <a:off x="2459728" y="2075565"/>
-            <a:ext cx="3249608" cy="769441"/>
-          </a:xfrm>
-          <a:prstGeom prst="rect">
-            <a:avLst/>
-          </a:prstGeom>
-          <a:noFill/>
-        </p:spPr>
-        <p:txBody>
-          <a:bodyPr wrap="none" rtlCol="0">
-            <a:spAutoFit/>
-          </a:bodyPr>
-          <a:lstStyle/>
-          <a:p>
-            <a:pPr algn="ctr"/>
-            <a:r>
-              <a:rPr kumimoji="1" lang="en-US" altLang="zh-TW" sz="1400" dirty="0">
-                <a:latin typeface="Arial" panose="020B0604020202020204" pitchFamily="34" charset="0"/>
-                <a:cs typeface="Arial" panose="020B0604020202020204" pitchFamily="34" charset="0"/>
-              </a:rPr>
-              <a:t>Taiwan Tech</a:t>
-            </a:r>
-          </a:p>
-          <a:p>
-            <a:r>
-              <a:rPr kumimoji="1" lang="en-US" altLang="zh-TW" sz="1400" dirty="0">
-                <a:latin typeface="Arial" panose="020B0604020202020204" pitchFamily="34" charset="0"/>
-                <a:cs typeface="Arial" panose="020B0604020202020204" pitchFamily="34" charset="0"/>
-              </a:rPr>
-              <a:t>Electronics and Computer Engineering</a:t>
-            </a:r>
-          </a:p>
-          <a:p>
-            <a:pPr algn="ctr"/>
-            <a:r>
-              <a:rPr kumimoji="1" lang="en-US" altLang="zh-TW" sz="1400" dirty="0">
-                <a:latin typeface="Arial" panose="020B0604020202020204" pitchFamily="34" charset="0"/>
-                <a:cs typeface="Arial" panose="020B0604020202020204" pitchFamily="34" charset="0"/>
-              </a:rPr>
-              <a:t>GPA: 3.88</a:t>
-            </a:r>
-            <a:r>
-              <a:rPr kumimoji="1" lang="en-US" altLang="zh-TW" sz="1600" dirty="0">
-                <a:latin typeface="Arial" panose="020B0604020202020204" pitchFamily="34" charset="0"/>
-                <a:cs typeface="Arial" panose="020B0604020202020204" pitchFamily="34" charset="0"/>
-              </a:rPr>
-              <a:t> / 4.3</a:t>
-            </a:r>
-            <a:endParaRPr kumimoji="1" lang="zh-TW" altLang="en-US" dirty="0">
-              <a:latin typeface="Arial" panose="020B0604020202020204" pitchFamily="34" charset="0"/>
-              <a:cs typeface="Arial" panose="020B0604020202020204" pitchFamily="34" charset="0"/>
-            </a:endParaRPr>
-          </a:p>
-        </p:txBody>
-      </p:sp>
-      <p:sp>
-        <p:nvSpPr>
-          <p:cNvPr id="12" name="文字方塊 11">
-            <a:extLst>
-              <a:ext uri="{FF2B5EF4-FFF2-40B4-BE49-F238E27FC236}">
-                <a16:creationId xmlns:a16="http://schemas.microsoft.com/office/drawing/2014/main" id="{5AF2DBF6-4877-8645-A3E4-4BECEB32F2A4}"/>
-              </a:ext>
-            </a:extLst>
-          </p:cNvPr>
-          <p:cNvSpPr txBox="1"/>
-          <p:nvPr/>
-        </p:nvSpPr>
-        <p:spPr>
-          <a:xfrm>
-            <a:off x="3603469" y="1770249"/>
-            <a:ext cx="1061509" cy="338554"/>
-          </a:xfrm>
-          <a:prstGeom prst="rect">
-            <a:avLst/>
-          </a:prstGeom>
-          <a:noFill/>
-        </p:spPr>
-        <p:txBody>
-          <a:bodyPr wrap="none" rtlCol="0">
-            <a:spAutoFit/>
-          </a:bodyPr>
-          <a:lstStyle/>
-          <a:p>
-            <a:r>
-              <a:rPr kumimoji="1" lang="en-US" altLang="zh-TW" sz="1600" b="1" dirty="0">
-                <a:latin typeface="Arial" panose="020B0604020202020204" pitchFamily="34" charset="0"/>
-                <a:cs typeface="Arial" panose="020B0604020202020204" pitchFamily="34" charset="0"/>
-              </a:rPr>
-              <a:t>Bachelor</a:t>
-            </a:r>
-            <a:endParaRPr kumimoji="1" lang="zh-TW" altLang="en-US" b="1" dirty="0">
-              <a:latin typeface="Arial" panose="020B0604020202020204" pitchFamily="34" charset="0"/>
-              <a:cs typeface="Arial" panose="020B0604020202020204" pitchFamily="34" charset="0"/>
-            </a:endParaRPr>
-          </a:p>
-        </p:txBody>
-      </p:sp>
+      </p:pic>
     </p:spTree>
     <p:extLst>
       <p:ext uri="{BB962C8B-B14F-4D97-AF65-F5344CB8AC3E}">

</xml_diff>

<commit_message>
Finished the botton function for profile
</commit_message>
<xml_diff>
--- a/img/portfolio/image-maker.pptx
+++ b/img/portfolio/image-maker.pptx
@@ -10,6 +10,7 @@
     <p:sldId id="258" r:id="rId4"/>
     <p:sldId id="259" r:id="rId5"/>
     <p:sldId id="260" r:id="rId6"/>
+    <p:sldId id="261" r:id="rId7"/>
   </p:sldIdLst>
   <p:sldSz cx="12192000" cy="6858000"/>
   <p:notesSz cx="6858000" cy="9144000"/>
@@ -263,7 +264,7 @@
           <a:p>
             <a:fld id="{F721C794-EA5C-7F40-97D9-858222FA7BF2}" type="datetimeFigureOut">
               <a:rPr kumimoji="1" lang="zh-TW" altLang="en-US" smtClean="0"/>
-              <a:t>2022/3/27</a:t>
+              <a:t>2022/3/28</a:t>
             </a:fld>
             <a:endParaRPr kumimoji="1" lang="zh-TW" altLang="en-US"/>
           </a:p>
@@ -461,7 +462,7 @@
           <a:p>
             <a:fld id="{F721C794-EA5C-7F40-97D9-858222FA7BF2}" type="datetimeFigureOut">
               <a:rPr kumimoji="1" lang="zh-TW" altLang="en-US" smtClean="0"/>
-              <a:t>2022/3/27</a:t>
+              <a:t>2022/3/28</a:t>
             </a:fld>
             <a:endParaRPr kumimoji="1" lang="zh-TW" altLang="en-US"/>
           </a:p>
@@ -669,7 +670,7 @@
           <a:p>
             <a:fld id="{F721C794-EA5C-7F40-97D9-858222FA7BF2}" type="datetimeFigureOut">
               <a:rPr kumimoji="1" lang="zh-TW" altLang="en-US" smtClean="0"/>
-              <a:t>2022/3/27</a:t>
+              <a:t>2022/3/28</a:t>
             </a:fld>
             <a:endParaRPr kumimoji="1" lang="zh-TW" altLang="en-US"/>
           </a:p>
@@ -867,7 +868,7 @@
           <a:p>
             <a:fld id="{F721C794-EA5C-7F40-97D9-858222FA7BF2}" type="datetimeFigureOut">
               <a:rPr kumimoji="1" lang="zh-TW" altLang="en-US" smtClean="0"/>
-              <a:t>2022/3/27</a:t>
+              <a:t>2022/3/28</a:t>
             </a:fld>
             <a:endParaRPr kumimoji="1" lang="zh-TW" altLang="en-US"/>
           </a:p>
@@ -1142,7 +1143,7 @@
           <a:p>
             <a:fld id="{F721C794-EA5C-7F40-97D9-858222FA7BF2}" type="datetimeFigureOut">
               <a:rPr kumimoji="1" lang="zh-TW" altLang="en-US" smtClean="0"/>
-              <a:t>2022/3/27</a:t>
+              <a:t>2022/3/28</a:t>
             </a:fld>
             <a:endParaRPr kumimoji="1" lang="zh-TW" altLang="en-US"/>
           </a:p>
@@ -1407,7 +1408,7 @@
           <a:p>
             <a:fld id="{F721C794-EA5C-7F40-97D9-858222FA7BF2}" type="datetimeFigureOut">
               <a:rPr kumimoji="1" lang="zh-TW" altLang="en-US" smtClean="0"/>
-              <a:t>2022/3/27</a:t>
+              <a:t>2022/3/28</a:t>
             </a:fld>
             <a:endParaRPr kumimoji="1" lang="zh-TW" altLang="en-US"/>
           </a:p>
@@ -1819,7 +1820,7 @@
           <a:p>
             <a:fld id="{F721C794-EA5C-7F40-97D9-858222FA7BF2}" type="datetimeFigureOut">
               <a:rPr kumimoji="1" lang="zh-TW" altLang="en-US" smtClean="0"/>
-              <a:t>2022/3/27</a:t>
+              <a:t>2022/3/28</a:t>
             </a:fld>
             <a:endParaRPr kumimoji="1" lang="zh-TW" altLang="en-US"/>
           </a:p>
@@ -1960,7 +1961,7 @@
           <a:p>
             <a:fld id="{F721C794-EA5C-7F40-97D9-858222FA7BF2}" type="datetimeFigureOut">
               <a:rPr kumimoji="1" lang="zh-TW" altLang="en-US" smtClean="0"/>
-              <a:t>2022/3/27</a:t>
+              <a:t>2022/3/28</a:t>
             </a:fld>
             <a:endParaRPr kumimoji="1" lang="zh-TW" altLang="en-US"/>
           </a:p>
@@ -2073,7 +2074,7 @@
           <a:p>
             <a:fld id="{F721C794-EA5C-7F40-97D9-858222FA7BF2}" type="datetimeFigureOut">
               <a:rPr kumimoji="1" lang="zh-TW" altLang="en-US" smtClean="0"/>
-              <a:t>2022/3/27</a:t>
+              <a:t>2022/3/28</a:t>
             </a:fld>
             <a:endParaRPr kumimoji="1" lang="zh-TW" altLang="en-US"/>
           </a:p>
@@ -2384,7 +2385,7 @@
           <a:p>
             <a:fld id="{F721C794-EA5C-7F40-97D9-858222FA7BF2}" type="datetimeFigureOut">
               <a:rPr kumimoji="1" lang="zh-TW" altLang="en-US" smtClean="0"/>
-              <a:t>2022/3/27</a:t>
+              <a:t>2022/3/28</a:t>
             </a:fld>
             <a:endParaRPr kumimoji="1" lang="zh-TW" altLang="en-US"/>
           </a:p>
@@ -2672,7 +2673,7 @@
           <a:p>
             <a:fld id="{F721C794-EA5C-7F40-97D9-858222FA7BF2}" type="datetimeFigureOut">
               <a:rPr kumimoji="1" lang="zh-TW" altLang="en-US" smtClean="0"/>
-              <a:t>2022/3/27</a:t>
+              <a:t>2022/3/28</a:t>
             </a:fld>
             <a:endParaRPr kumimoji="1" lang="zh-TW" altLang="en-US"/>
           </a:p>
@@ -2913,7 +2914,7 @@
           <a:p>
             <a:fld id="{F721C794-EA5C-7F40-97D9-858222FA7BF2}" type="datetimeFigureOut">
               <a:rPr kumimoji="1" lang="zh-TW" altLang="en-US" smtClean="0"/>
-              <a:t>2022/3/27</a:t>
+              <a:t>2022/3/28</a:t>
             </a:fld>
             <a:endParaRPr kumimoji="1" lang="zh-TW" altLang="en-US"/>
           </a:p>
@@ -4628,10 +4629,247 @@
           </a:prstGeom>
         </p:spPr>
       </p:pic>
+      <p:sp>
+        <p:nvSpPr>
+          <p:cNvPr id="5" name="三角形 4">
+            <a:extLst>
+              <a:ext uri="{FF2B5EF4-FFF2-40B4-BE49-F238E27FC236}">
+                <a16:creationId xmlns:a16="http://schemas.microsoft.com/office/drawing/2014/main" id="{E5C6DE55-555E-E741-867A-E95B12D3FCE1}"/>
+              </a:ext>
+            </a:extLst>
+          </p:cNvPr>
+          <p:cNvSpPr/>
+          <p:nvPr/>
+        </p:nvSpPr>
+        <p:spPr>
+          <a:xfrm rot="16200000">
+            <a:off x="9207969" y="3063137"/>
+            <a:ext cx="1440000" cy="1245600"/>
+          </a:xfrm>
+          <a:prstGeom prst="triangle">
+            <a:avLst/>
+          </a:prstGeom>
+          <a:solidFill>
+            <a:schemeClr val="tx1">
+              <a:lumMod val="85000"/>
+              <a:lumOff val="15000"/>
+            </a:schemeClr>
+          </a:solidFill>
+          <a:ln>
+            <a:noFill/>
+          </a:ln>
+        </p:spPr>
+        <p:style>
+          <a:lnRef idx="2">
+            <a:schemeClr val="accent1">
+              <a:shade val="50000"/>
+            </a:schemeClr>
+          </a:lnRef>
+          <a:fillRef idx="1">
+            <a:schemeClr val="accent1"/>
+          </a:fillRef>
+          <a:effectRef idx="0">
+            <a:schemeClr val="accent1"/>
+          </a:effectRef>
+          <a:fontRef idx="minor">
+            <a:schemeClr val="lt1"/>
+          </a:fontRef>
+        </p:style>
+        <p:txBody>
+          <a:bodyPr rtlCol="0" anchor="ctr"/>
+          <a:lstStyle/>
+          <a:p>
+            <a:pPr algn="ctr"/>
+            <a:endParaRPr kumimoji="1" lang="zh-TW" altLang="en-US"/>
+          </a:p>
+        </p:txBody>
+      </p:sp>
+      <p:sp>
+        <p:nvSpPr>
+          <p:cNvPr id="6" name="三角形 5">
+            <a:extLst>
+              <a:ext uri="{FF2B5EF4-FFF2-40B4-BE49-F238E27FC236}">
+                <a16:creationId xmlns:a16="http://schemas.microsoft.com/office/drawing/2014/main" id="{CE9C36C5-895F-DC42-9BCE-91D4E88AAB71}"/>
+              </a:ext>
+            </a:extLst>
+          </p:cNvPr>
+          <p:cNvSpPr/>
+          <p:nvPr/>
+        </p:nvSpPr>
+        <p:spPr>
+          <a:xfrm rot="5400000">
+            <a:off x="9360369" y="3215537"/>
+            <a:ext cx="1440000" cy="1245600"/>
+          </a:xfrm>
+          <a:prstGeom prst="triangle">
+            <a:avLst/>
+          </a:prstGeom>
+          <a:solidFill>
+            <a:schemeClr val="tx1">
+              <a:lumMod val="85000"/>
+              <a:lumOff val="15000"/>
+            </a:schemeClr>
+          </a:solidFill>
+          <a:ln>
+            <a:noFill/>
+          </a:ln>
+        </p:spPr>
+        <p:style>
+          <a:lnRef idx="2">
+            <a:schemeClr val="accent1">
+              <a:shade val="50000"/>
+            </a:schemeClr>
+          </a:lnRef>
+          <a:fillRef idx="1">
+            <a:schemeClr val="accent1"/>
+          </a:fillRef>
+          <a:effectRef idx="0">
+            <a:schemeClr val="accent1"/>
+          </a:effectRef>
+          <a:fontRef idx="minor">
+            <a:schemeClr val="lt1"/>
+          </a:fontRef>
+        </p:style>
+        <p:txBody>
+          <a:bodyPr rtlCol="0" anchor="ctr"/>
+          <a:lstStyle/>
+          <a:p>
+            <a:pPr algn="ctr"/>
+            <a:endParaRPr kumimoji="1" lang="zh-TW" altLang="en-US"/>
+          </a:p>
+        </p:txBody>
+      </p:sp>
     </p:spTree>
     <p:extLst>
       <p:ext uri="{BB962C8B-B14F-4D97-AF65-F5344CB8AC3E}">
         <p14:creationId xmlns:p14="http://schemas.microsoft.com/office/powerpoint/2010/main" val="2423688279"/>
+      </p:ext>
+    </p:extLst>
+  </p:cSld>
+  <p:clrMapOvr>
+    <a:masterClrMapping/>
+  </p:clrMapOvr>
+</p:sld>
+</file>
+
+<file path=ppt/slides/slide6.xml><?xml version="1.0" encoding="utf-8"?>
+<p:sld xmlns:a="http://schemas.openxmlformats.org/drawingml/2006/main" xmlns:r="http://schemas.openxmlformats.org/officeDocument/2006/relationships" xmlns:p="http://schemas.openxmlformats.org/presentationml/2006/main">
+  <p:cSld>
+    <p:spTree>
+      <p:nvGrpSpPr>
+        <p:cNvPr id="1" name=""/>
+        <p:cNvGrpSpPr/>
+        <p:nvPr/>
+      </p:nvGrpSpPr>
+      <p:grpSpPr>
+        <a:xfrm>
+          <a:off x="0" y="0"/>
+          <a:ext cx="0" cy="0"/>
+          <a:chOff x="0" y="0"/>
+          <a:chExt cx="0" cy="0"/>
+        </a:xfrm>
+      </p:grpSpPr>
+      <p:sp>
+        <p:nvSpPr>
+          <p:cNvPr id="2" name="標題 1">
+            <a:extLst>
+              <a:ext uri="{FF2B5EF4-FFF2-40B4-BE49-F238E27FC236}">
+                <a16:creationId xmlns:a16="http://schemas.microsoft.com/office/drawing/2014/main" id="{D9384A0F-61C5-344A-8837-2BE15500E367}"/>
+              </a:ext>
+            </a:extLst>
+          </p:cNvPr>
+          <p:cNvSpPr>
+            <a:spLocks noGrp="1"/>
+          </p:cNvSpPr>
+          <p:nvPr>
+            <p:ph type="title"/>
+          </p:nvPr>
+        </p:nvSpPr>
+        <p:spPr/>
+        <p:txBody>
+          <a:bodyPr/>
+          <a:lstStyle/>
+          <a:p>
+            <a:endParaRPr kumimoji="1" lang="zh-TW" altLang="en-US"/>
+          </a:p>
+        </p:txBody>
+      </p:sp>
+      <p:sp>
+        <p:nvSpPr>
+          <p:cNvPr id="3" name="內容版面配置區 2">
+            <a:extLst>
+              <a:ext uri="{FF2B5EF4-FFF2-40B4-BE49-F238E27FC236}">
+                <a16:creationId xmlns:a16="http://schemas.microsoft.com/office/drawing/2014/main" id="{A681E684-C654-B840-B91B-9755917B5FB1}"/>
+              </a:ext>
+            </a:extLst>
+          </p:cNvPr>
+          <p:cNvSpPr>
+            <a:spLocks noGrp="1"/>
+          </p:cNvSpPr>
+          <p:nvPr>
+            <p:ph idx="1"/>
+          </p:nvPr>
+        </p:nvSpPr>
+        <p:spPr/>
+        <p:txBody>
+          <a:bodyPr/>
+          <a:lstStyle/>
+          <a:p>
+            <a:endParaRPr kumimoji="1" lang="zh-TW" altLang="en-US" dirty="0"/>
+          </a:p>
+        </p:txBody>
+      </p:sp>
+      <p:sp>
+        <p:nvSpPr>
+          <p:cNvPr id="4" name="三角形 3">
+            <a:extLst>
+              <a:ext uri="{FF2B5EF4-FFF2-40B4-BE49-F238E27FC236}">
+                <a16:creationId xmlns:a16="http://schemas.microsoft.com/office/drawing/2014/main" id="{1ED9B2DC-2071-AD42-A1B7-97C7E8B6F1C3}"/>
+              </a:ext>
+            </a:extLst>
+          </p:cNvPr>
+          <p:cNvSpPr/>
+          <p:nvPr/>
+        </p:nvSpPr>
+        <p:spPr>
+          <a:xfrm rot="5400000">
+            <a:off x="3170585" y="3145200"/>
+            <a:ext cx="1440000" cy="1245600"/>
+          </a:xfrm>
+          <a:prstGeom prst="triangle">
+            <a:avLst/>
+          </a:prstGeom>
+          <a:ln/>
+        </p:spPr>
+        <p:style>
+          <a:lnRef idx="2">
+            <a:schemeClr val="accent1">
+              <a:shade val="50000"/>
+            </a:schemeClr>
+          </a:lnRef>
+          <a:fillRef idx="1">
+            <a:schemeClr val="accent1"/>
+          </a:fillRef>
+          <a:effectRef idx="0">
+            <a:schemeClr val="accent1"/>
+          </a:effectRef>
+          <a:fontRef idx="minor">
+            <a:schemeClr val="lt1"/>
+          </a:fontRef>
+        </p:style>
+        <p:txBody>
+          <a:bodyPr rtlCol="0" anchor="ctr"/>
+          <a:lstStyle/>
+          <a:p>
+            <a:pPr algn="ctr"/>
+            <a:endParaRPr kumimoji="1" lang="zh-TW" altLang="en-US"/>
+          </a:p>
+        </p:txBody>
+      </p:sp>
+    </p:spTree>
+    <p:extLst>
+      <p:ext uri="{BB962C8B-B14F-4D97-AF65-F5344CB8AC3E}">
+        <p14:creationId xmlns:p14="http://schemas.microsoft.com/office/powerpoint/2010/main" val="2805936680"/>
       </p:ext>
     </p:extLst>
   </p:cSld>

</xml_diff>